<commit_message>
updated figures in presentation with caption
git-svn-id: file://localhost/tmp/svn2git/svn@7492 defb5e50-622e-49ec-a68e-d72c7db87b45
</commit_message>
<xml_diff>
--- a/papers/saga-mr-ngs/ecmls12.pptx
+++ b/papers/saga-mr-ngs/ecmls12.pptx
@@ -6,7 +6,7 @@
     <p:sldMasterId id="2147483677" r:id="rId2"/>
   </p:sldMasterIdLst>
   <p:notesMasterIdLst>
-    <p:notesMasterId r:id="rId25"/>
+    <p:notesMasterId r:id="rId27"/>
   </p:notesMasterIdLst>
   <p:sldIdLst>
     <p:sldId id="256" r:id="rId3"/>
@@ -27,10 +27,12 @@
     <p:sldId id="860" r:id="rId18"/>
     <p:sldId id="856" r:id="rId19"/>
     <p:sldId id="857" r:id="rId20"/>
-    <p:sldId id="861" r:id="rId21"/>
-    <p:sldId id="862" r:id="rId22"/>
-    <p:sldId id="757" r:id="rId23"/>
-    <p:sldId id="759" r:id="rId24"/>
+    <p:sldId id="865" r:id="rId21"/>
+    <p:sldId id="866" r:id="rId22"/>
+    <p:sldId id="867" r:id="rId23"/>
+    <p:sldId id="868" r:id="rId24"/>
+    <p:sldId id="757" r:id="rId25"/>
+    <p:sldId id="759" r:id="rId26"/>
   </p:sldIdLst>
   <p:sldSz cx="9144000" cy="6858000" type="screen4x3"/>
   <p:notesSz cx="6858000" cy="9144000"/>
@@ -215,7 +217,7 @@
             <a:fld id="{8E161E8F-4E15-A840-9658-105F9DD3DE22}" type="datetimeFigureOut">
               <a:rPr lang="en-US" smtClean="0"/>
               <a:pPr/>
-              <a:t>6/12/12</a:t>
+              <a:t>6/21/12</a:t>
             </a:fld>
             <a:endParaRPr lang="en-US"/>
           </a:p>
@@ -1069,7 +1071,7 @@
             <a:fld id="{4C4AD4EB-88D0-C141-9474-CCD86A78CB94}" type="datetimeFigureOut">
               <a:rPr lang="en-US" smtClean="0"/>
               <a:pPr/>
-              <a:t>6/12/12</a:t>
+              <a:t>6/21/12</a:t>
             </a:fld>
             <a:endParaRPr lang="en-US" dirty="0"/>
           </a:p>
@@ -1392,7 +1394,7 @@
             <a:fld id="{4C4AD4EB-88D0-C141-9474-CCD86A78CB94}" type="datetimeFigureOut">
               <a:rPr lang="en-US" smtClean="0"/>
               <a:pPr/>
-              <a:t>6/12/12</a:t>
+              <a:t>6/21/12</a:t>
             </a:fld>
             <a:endParaRPr lang="en-US"/>
           </a:p>
@@ -1668,7 +1670,7 @@
             <a:fld id="{4C4AD4EB-88D0-C141-9474-CCD86A78CB94}" type="datetimeFigureOut">
               <a:rPr lang="en-US" smtClean="0"/>
               <a:pPr/>
-              <a:t>6/12/12</a:t>
+              <a:t>6/21/12</a:t>
             </a:fld>
             <a:endParaRPr lang="en-US"/>
           </a:p>
@@ -1960,7 +1962,7 @@
             <a:fld id="{4C4AD4EB-88D0-C141-9474-CCD86A78CB94}" type="datetimeFigureOut">
               <a:rPr lang="en-US" smtClean="0"/>
               <a:pPr/>
-              <a:t>6/12/12</a:t>
+              <a:t>6/21/12</a:t>
             </a:fld>
             <a:endParaRPr lang="en-US"/>
           </a:p>
@@ -2287,7 +2289,7 @@
             <a:fld id="{4C4AD4EB-88D0-C141-9474-CCD86A78CB94}" type="datetimeFigureOut">
               <a:rPr lang="en-US" smtClean="0"/>
               <a:pPr/>
-              <a:t>6/12/12</a:t>
+              <a:t>6/21/12</a:t>
             </a:fld>
             <a:endParaRPr lang="en-US"/>
           </a:p>
@@ -2535,7 +2537,7 @@
             <a:fld id="{4C4AD4EB-88D0-C141-9474-CCD86A78CB94}" type="datetimeFigureOut">
               <a:rPr lang="en-US" smtClean="0"/>
               <a:pPr/>
-              <a:t>6/12/12</a:t>
+              <a:t>6/21/12</a:t>
             </a:fld>
             <a:endParaRPr lang="en-US"/>
           </a:p>
@@ -2712,7 +2714,7 @@
             <a:fld id="{4C4AD4EB-88D0-C141-9474-CCD86A78CB94}" type="datetimeFigureOut">
               <a:rPr lang="en-US" smtClean="0"/>
               <a:pPr/>
-              <a:t>6/12/12</a:t>
+              <a:t>6/21/12</a:t>
             </a:fld>
             <a:endParaRPr lang="en-US"/>
           </a:p>
@@ -3089,7 +3091,7 @@
             <a:fld id="{4C4AD4EB-88D0-C141-9474-CCD86A78CB94}" type="datetimeFigureOut">
               <a:rPr lang="en-US" smtClean="0"/>
               <a:pPr/>
-              <a:t>6/12/12</a:t>
+              <a:t>6/21/12</a:t>
             </a:fld>
             <a:endParaRPr lang="en-US"/>
           </a:p>
@@ -3360,7 +3362,7 @@
             <a:fld id="{4C4AD4EB-88D0-C141-9474-CCD86A78CB94}" type="datetimeFigureOut">
               <a:rPr lang="en-US" smtClean="0"/>
               <a:pPr/>
-              <a:t>6/12/12</a:t>
+              <a:t>6/21/12</a:t>
             </a:fld>
             <a:endParaRPr lang="en-US"/>
           </a:p>
@@ -3668,7 +3670,7 @@
             <a:fld id="{4C4AD4EB-88D0-C141-9474-CCD86A78CB94}" type="datetimeFigureOut">
               <a:rPr lang="en-US" smtClean="0"/>
               <a:pPr/>
-              <a:t>6/12/12</a:t>
+              <a:t>6/21/12</a:t>
             </a:fld>
             <a:endParaRPr lang="en-US"/>
           </a:p>
@@ -3962,7 +3964,7 @@
             <a:fld id="{4C4AD4EB-88D0-C141-9474-CCD86A78CB94}" type="datetimeFigureOut">
               <a:rPr lang="en-US" smtClean="0"/>
               <a:pPr/>
-              <a:t>6/12/12</a:t>
+              <a:t>6/21/12</a:t>
             </a:fld>
             <a:endParaRPr lang="en-US"/>
           </a:p>
@@ -4394,7 +4396,7 @@
             <a:fld id="{4C4AD4EB-88D0-C141-9474-CCD86A78CB94}" type="datetimeFigureOut">
               <a:rPr lang="en-US" smtClean="0"/>
               <a:pPr/>
-              <a:t>6/12/12</a:t>
+              <a:t>6/21/12</a:t>
             </a:fld>
             <a:endParaRPr lang="en-US"/>
           </a:p>
@@ -4742,7 +4744,7 @@
             <a:fld id="{4C4AD4EB-88D0-C141-9474-CCD86A78CB94}" type="datetimeFigureOut">
               <a:rPr lang="en-US" smtClean="0"/>
               <a:pPr/>
-              <a:t>6/12/12</a:t>
+              <a:t>6/21/12</a:t>
             </a:fld>
             <a:endParaRPr lang="en-US"/>
           </a:p>
@@ -4834,7 +4836,7 @@
             <a:fld id="{4C4AD4EB-88D0-C141-9474-CCD86A78CB94}" type="datetimeFigureOut">
               <a:rPr lang="en-US" smtClean="0"/>
               <a:pPr/>
-              <a:t>6/12/12</a:t>
+              <a:t>6/21/12</a:t>
             </a:fld>
             <a:endParaRPr lang="en-US"/>
           </a:p>
@@ -5173,7 +5175,7 @@
             <a:fld id="{4C4AD4EB-88D0-C141-9474-CCD86A78CB94}" type="datetimeFigureOut">
               <a:rPr lang="en-US" smtClean="0"/>
               <a:pPr/>
-              <a:t>6/12/12</a:t>
+              <a:t>6/21/12</a:t>
             </a:fld>
             <a:endParaRPr lang="en-US"/>
           </a:p>
@@ -5387,7 +5389,7 @@
             <a:fld id="{4C4AD4EB-88D0-C141-9474-CCD86A78CB94}" type="datetimeFigureOut">
               <a:rPr lang="en-US" smtClean="0"/>
               <a:pPr/>
-              <a:t>6/12/12</a:t>
+              <a:t>6/21/12</a:t>
             </a:fld>
             <a:endParaRPr lang="en-US"/>
           </a:p>
@@ -6069,7 +6071,7 @@
             <a:fld id="{9CA5C856-D373-2E49-9257-F90004C68B8A}" type="datetimeFigureOut">
               <a:rPr lang="en-US" smtClean="0"/>
               <a:pPr/>
-              <a:t>6/12/12</a:t>
+              <a:t>6/21/12</a:t>
             </a:fld>
             <a:endParaRPr lang="en-US" dirty="0"/>
           </a:p>
@@ -7204,8 +7206,8 @@
             <p:ph idx="1"/>
           </p:nvPr>
         </p:nvPicPr>
-        <mc:AlternateContent>
-          <mc:Choice xmlns:ma="http://schemas.microsoft.com/office/mac/drawingml/2008/main" Requires="ma">
+        <mc:AlternateContent xmlns:ma="http://schemas.microsoft.com/office/mac/drawingml/2008/main">
+          <mc:Choice Requires="ma">
             <p:blipFill>
               <a:blip r:embed="rId2"/>
               <a:srcRect l="-21672" r="-21672"/>
@@ -7214,7 +7216,7 @@
               </a:stretch>
             </p:blipFill>
           </mc:Choice>
-          <mc:Fallback>
+          <mc:Fallback xmlns:p="http://schemas.openxmlformats.org/presentationml/2006/main" xmlns:mv="urn:schemas-microsoft-com:mac:vml" xmlns:mc="http://schemas.openxmlformats.org/markup-compatibility/2006" xmlns:r="http://schemas.openxmlformats.org/officeDocument/2006/relationships" xmlns:a="http://schemas.openxmlformats.org/drawingml/2006/main" xmlns="">
             <p:blipFill>
               <a:blip r:embed="rId3"/>
               <a:srcRect l="-21672" r="-21672"/>
@@ -7390,21 +7392,13 @@
             </a:r>
             <a:r>
               <a:rPr lang="en-US" dirty="0" smtClean="0"/>
-              <a:t> (</a:t>
-            </a:r>
+              <a:t> (PMR) can be configured as</a:t>
+            </a:r>
+          </a:p>
+          <a:p>
             <a:r>
               <a:rPr lang="en-US" dirty="0" smtClean="0"/>
-              <a:t>PMR) can be configured as</a:t>
-            </a:r>
-          </a:p>
-          <a:p>
-            <a:r>
-              <a:rPr lang="en-US" dirty="0" smtClean="0"/>
-              <a:t>Local </a:t>
-            </a:r>
-            <a:r>
-              <a:rPr lang="en-US" dirty="0" smtClean="0"/>
-              <a:t>MR</a:t>
+              <a:t>Local MR</a:t>
             </a:r>
           </a:p>
           <a:p>
@@ -7413,16 +7407,11 @@
               <a:rPr lang="en-US" dirty="0" smtClean="0"/>
               <a:t>Localization of data is costly</a:t>
             </a:r>
-            <a:endParaRPr lang="en-US" dirty="0" smtClean="0"/>
           </a:p>
           <a:p>
             <a:r>
               <a:rPr lang="en-US" dirty="0" smtClean="0"/>
-              <a:t>Hierarchical </a:t>
-            </a:r>
-            <a:r>
-              <a:rPr lang="en-US" dirty="0" smtClean="0"/>
-              <a:t>MR</a:t>
+              <a:t>Hierarchical MR</a:t>
             </a:r>
           </a:p>
           <a:p>
@@ -7431,27 +7420,18 @@
               <a:rPr lang="en-US" dirty="0" smtClean="0"/>
               <a:t>Suitable for distributed data analysis. Global reduce is overhead and is not easy and straight forward to design for all kinds of application.</a:t>
             </a:r>
-            <a:endParaRPr lang="en-US" dirty="0" smtClean="0"/>
           </a:p>
           <a:p>
             <a:r>
               <a:rPr lang="en-US" dirty="0" smtClean="0"/>
-              <a:t>Distributed </a:t>
-            </a:r>
+              <a:t>Distributed MR</a:t>
+            </a:r>
+          </a:p>
+          <a:p>
+            <a:pPr lvl="1"/>
             <a:r>
               <a:rPr lang="en-US" dirty="0" smtClean="0"/>
-              <a:t>MR</a:t>
-            </a:r>
-          </a:p>
-          <a:p>
-            <a:pPr lvl="1"/>
-            <a:r>
-              <a:rPr lang="en-US" dirty="0" smtClean="0"/>
-              <a:t>Suitable for distributed data analysis.</a:t>
-            </a:r>
-            <a:r>
-              <a:rPr lang="en-US" dirty="0" smtClean="0"/>
-              <a:t> No global reduce is required.</a:t>
+              <a:t>Suitable for distributed data analysis. No global reduce is required.</a:t>
             </a:r>
           </a:p>
           <a:p>
@@ -7653,11 +7633,7 @@
             </a:r>
             <a:r>
               <a:rPr lang="en-US" dirty="0" smtClean="0"/>
-              <a:t>:</a:t>
-            </a:r>
-            <a:r>
-              <a:rPr lang="en-US" dirty="0" smtClean="0"/>
-              <a:t> </a:t>
+              <a:t>: </a:t>
             </a:r>
           </a:p>
           <a:p>
@@ -7670,44 +7646,19 @@
               <a:rPr lang="en-US" dirty="0" smtClean="0"/>
               <a:t> API based</a:t>
             </a:r>
-            <a:endParaRPr lang="en-US" dirty="0" smtClean="0"/>
           </a:p>
           <a:p>
             <a:pPr lvl="2"/>
             <a:r>
               <a:rPr lang="en-US" dirty="0" smtClean="0"/>
-              <a:t>S</a:t>
-            </a:r>
+              <a:t>Short read alignment using BWA aligner in map phase </a:t>
+            </a:r>
+          </a:p>
+          <a:p>
+            <a:pPr lvl="2"/>
             <a:r>
               <a:rPr lang="en-US" dirty="0" smtClean="0"/>
-              <a:t>hort </a:t>
-            </a:r>
-            <a:r>
-              <a:rPr lang="en-US" dirty="0" smtClean="0"/>
-              <a:t>read alignment using BWA aligner in map phase</a:t>
-            </a:r>
-            <a:r>
-              <a:rPr lang="en-US" dirty="0" smtClean="0"/>
-              <a:t> </a:t>
-            </a:r>
-          </a:p>
-          <a:p>
-            <a:pPr lvl="2"/>
-            <a:r>
-              <a:rPr lang="en-US" dirty="0" smtClean="0"/>
-              <a:t>D</a:t>
-            </a:r>
-            <a:r>
-              <a:rPr lang="en-US" dirty="0" smtClean="0"/>
-              <a:t>uplicate </a:t>
-            </a:r>
-            <a:r>
-              <a:rPr lang="en-US" dirty="0" smtClean="0"/>
-              <a:t>read removal in reduce </a:t>
-            </a:r>
-            <a:r>
-              <a:rPr lang="en-US" dirty="0" smtClean="0"/>
-              <a:t>phase</a:t>
+              <a:t>Duplicate read removal in reduce phase</a:t>
             </a:r>
           </a:p>
           <a:p>
@@ -7718,11 +7669,7 @@
             <a:pPr lvl="1"/>
             <a:r>
               <a:rPr lang="en-US" dirty="0" smtClean="0"/>
-              <a:t>Crossbow:</a:t>
-            </a:r>
-            <a:r>
-              <a:rPr lang="en-US" dirty="0" smtClean="0"/>
-              <a:t> </a:t>
+              <a:t>Crossbow: </a:t>
             </a:r>
           </a:p>
           <a:p>
@@ -7733,27 +7680,14 @@
             </a:r>
             <a:r>
               <a:rPr lang="en-US" dirty="0" smtClean="0"/>
-              <a:t> </a:t>
-            </a:r>
+              <a:t> Streaming </a:t>
+            </a:r>
+          </a:p>
+          <a:p>
+            <a:pPr lvl="2"/>
             <a:r>
               <a:rPr lang="en-US" dirty="0" smtClean="0"/>
-              <a:t>Streaming</a:t>
-            </a:r>
-            <a:r>
-              <a:rPr lang="en-US" dirty="0" smtClean="0"/>
-              <a:t> </a:t>
-            </a:r>
-            <a:endParaRPr lang="en-US" dirty="0" smtClean="0"/>
-          </a:p>
-          <a:p>
-            <a:pPr lvl="2"/>
-            <a:r>
-              <a:rPr lang="en-US" dirty="0" smtClean="0"/>
-              <a:t>Contains </a:t>
-            </a:r>
-            <a:r>
-              <a:rPr lang="en-US" dirty="0" smtClean="0"/>
-              <a:t>4 steps - preprocessing, Alignment, SNP finding and </a:t>
+              <a:t>Contains 4 steps - preprocessing, Alignment, SNP finding and </a:t>
             </a:r>
             <a:r>
               <a:rPr lang="en-US" dirty="0" err="1" smtClean="0"/>
@@ -7761,22 +7695,14 @@
             </a:r>
             <a:r>
               <a:rPr lang="en-US" dirty="0" smtClean="0"/>
-              <a:t>.</a:t>
-            </a:r>
+              <a:t>. </a:t>
+            </a:r>
+          </a:p>
+          <a:p>
+            <a:pPr lvl="2"/>
             <a:r>
               <a:rPr lang="en-US" dirty="0" smtClean="0"/>
-              <a:t> </a:t>
-            </a:r>
-          </a:p>
-          <a:p>
-            <a:pPr lvl="2"/>
-            <a:r>
-              <a:rPr lang="en-US" dirty="0" smtClean="0"/>
-              <a:t>Each </a:t>
-            </a:r>
-            <a:r>
-              <a:rPr lang="en-US" dirty="0" smtClean="0"/>
-              <a:t>step is a </a:t>
+              <a:t>Each step is a </a:t>
             </a:r>
             <a:r>
               <a:rPr lang="en-US" dirty="0" err="1" smtClean="0"/>
@@ -7961,8 +7887,8 @@
         </mc:AlternateContent>
         <p:spPr>
           <a:xfrm>
-            <a:off x="676254" y="1178114"/>
-            <a:ext cx="3985340" cy="2572220"/>
+            <a:off x="396159" y="1178114"/>
+            <a:ext cx="4510681" cy="2911286"/>
           </a:xfrm>
         </p:spPr>
       </p:pic>
@@ -7994,7 +7920,7 @@
         </mc:AlternateContent>
         <p:spPr>
           <a:xfrm>
-            <a:off x="4661594" y="1178114"/>
+            <a:off x="4661594" y="1346200"/>
             <a:ext cx="4482406" cy="2305520"/>
           </a:xfrm>
           <a:prstGeom prst="rect">
@@ -8002,42 +7928,160 @@
           </a:prstGeom>
         </p:spPr>
       </p:pic>
-      <p:pic>
-        <p:nvPicPr>
-          <p:cNvPr id="7" name="Picture 6" descr="seqal_lprm_dpmr-full_5.pdf"/>
-          <p:cNvPicPr>
-            <a:picLocks noChangeAspect="1"/>
-          </p:cNvPicPr>
+      <p:sp>
+        <p:nvSpPr>
+          <p:cNvPr id="6" name="TextBox 5"/>
+          <p:cNvSpPr txBox="1"/>
           <p:nvPr/>
-        </p:nvPicPr>
-        <mc:AlternateContent>
-          <mc:Choice xmlns:ma="http://schemas.microsoft.com/office/mac/drawingml/2008/main" Requires="ma">
-            <p:blipFill>
-              <a:blip r:embed="rId6"/>
-              <a:stretch>
-                <a:fillRect/>
-              </a:stretch>
-            </p:blipFill>
-          </mc:Choice>
-          <mc:Fallback>
-            <p:blipFill>
-              <a:blip r:embed="rId7"/>
-              <a:stretch>
-                <a:fillRect/>
-              </a:stretch>
-            </p:blipFill>
-          </mc:Fallback>
-        </mc:AlternateContent>
+        </p:nvSpPr>
         <p:spPr>
           <a:xfrm>
-            <a:off x="1919532" y="3483634"/>
-            <a:ext cx="5356873" cy="3107666"/>
+            <a:off x="396159" y="4089400"/>
+            <a:ext cx="4423206" cy="1569660"/>
           </a:xfrm>
           <a:prstGeom prst="rect">
             <a:avLst/>
           </a:prstGeom>
+          <a:noFill/>
         </p:spPr>
-      </p:pic>
+        <p:txBody>
+          <a:bodyPr wrap="none" rtlCol="0">
+            <a:spAutoFit/>
+          </a:bodyPr>
+          <a:lstStyle/>
+          <a:p>
+            <a:r>
+              <a:rPr lang="en-US" sz="1200" b="1" dirty="0" smtClean="0"/>
+              <a:t>Scale-Out:</a:t>
+            </a:r>
+          </a:p>
+          <a:p>
+            <a:r>
+              <a:rPr lang="en-US" sz="1200" dirty="0" smtClean="0"/>
+              <a:t>Read size dependent time-to-solution is measured for </a:t>
+            </a:r>
+          </a:p>
+          <a:p>
+            <a:r>
+              <a:rPr lang="en-US" sz="1200" dirty="0" err="1" smtClean="0"/>
+              <a:t>MapReduce</a:t>
+            </a:r>
+            <a:r>
+              <a:rPr lang="en-US" sz="1200" dirty="0" smtClean="0"/>
+              <a:t> tasks of read alignment and duplicate read</a:t>
+            </a:r>
+          </a:p>
+          <a:p>
+            <a:r>
+              <a:rPr lang="en-US" sz="1200" dirty="0" smtClean="0"/>
+              <a:t>removal. The number of nodes for this experiment is </a:t>
+            </a:r>
+          </a:p>
+          <a:p>
+            <a:r>
+              <a:rPr lang="en-US" sz="1200" dirty="0" smtClean="0"/>
+              <a:t>16(128 cores), the number of Workers is 32, and the </a:t>
+            </a:r>
+          </a:p>
+          <a:p>
+            <a:r>
+              <a:rPr lang="en-US" sz="1200" dirty="0" smtClean="0"/>
+              <a:t>chunk size is set to contain 625000 reads. The number of </a:t>
+            </a:r>
+          </a:p>
+          <a:p>
+            <a:r>
+              <a:rPr lang="en-US" sz="1200" dirty="0" smtClean="0"/>
+              <a:t>Reducers is set to 8. BWA is used for read alignment. </a:t>
+            </a:r>
+          </a:p>
+          <a:p>
+            <a:endParaRPr lang="en-US" sz="1200" dirty="0"/>
+          </a:p>
+        </p:txBody>
+      </p:sp>
+      <p:sp>
+        <p:nvSpPr>
+          <p:cNvPr id="8" name="TextBox 7"/>
+          <p:cNvSpPr txBox="1"/>
+          <p:nvPr/>
+        </p:nvSpPr>
+        <p:spPr>
+          <a:xfrm>
+            <a:off x="5015558" y="4089400"/>
+            <a:ext cx="4158034" cy="1754327"/>
+          </a:xfrm>
+          <a:prstGeom prst="rect">
+            <a:avLst/>
+          </a:prstGeom>
+          <a:noFill/>
+        </p:spPr>
+        <p:txBody>
+          <a:bodyPr wrap="none" rtlCol="0">
+            <a:spAutoFit/>
+          </a:bodyPr>
+          <a:lstStyle/>
+          <a:p>
+            <a:r>
+              <a:rPr lang="en-US" sz="1200" b="1" dirty="0" smtClean="0"/>
+              <a:t>Scale-Up:</a:t>
+            </a:r>
+          </a:p>
+          <a:p>
+            <a:r>
+              <a:rPr lang="en-US" sz="1200" dirty="0" smtClean="0"/>
+              <a:t>PMR scalability of a </a:t>
+            </a:r>
+            <a:r>
+              <a:rPr lang="en-US" sz="1200" dirty="0" err="1" smtClean="0"/>
+              <a:t>MapReduce</a:t>
+            </a:r>
+            <a:r>
+              <a:rPr lang="en-US" sz="1200" dirty="0" smtClean="0"/>
+              <a:t>-based computation </a:t>
+            </a:r>
+          </a:p>
+          <a:p>
+            <a:r>
+              <a:rPr lang="en-US" sz="1200" dirty="0" smtClean="0"/>
+              <a:t>for read alignment and duplicate read removal. The </a:t>
+            </a:r>
+          </a:p>
+          <a:p>
+            <a:r>
+              <a:rPr lang="en-US" sz="1200" dirty="0" smtClean="0"/>
+              <a:t>number of workers per node is set to 2 and the</a:t>
+            </a:r>
+          </a:p>
+          <a:p>
+            <a:r>
+              <a:rPr lang="en-US" sz="1200" dirty="0" smtClean="0"/>
+              <a:t>number of cores per each node is 8. The input read </a:t>
+            </a:r>
+          </a:p>
+          <a:p>
+            <a:r>
+              <a:rPr lang="en-US" sz="1200" dirty="0" smtClean="0"/>
+              <a:t>file is 10GB, the number of Reducers is set to 8, The </a:t>
+            </a:r>
+          </a:p>
+          <a:p>
+            <a:r>
+              <a:rPr lang="en-US" sz="1200" dirty="0" smtClean="0"/>
+              <a:t>number of reads in a chunk is 625000. BWA is used for </a:t>
+            </a:r>
+          </a:p>
+          <a:p>
+            <a:r>
+              <a:rPr lang="en-US" sz="1200" dirty="0" smtClean="0"/>
+              <a:t>read alignment </a:t>
+            </a:r>
+          </a:p>
+          <a:p>
+            <a:endParaRPr lang="en-US" sz="1200" dirty="0"/>
+          </a:p>
+        </p:txBody>
+      </p:sp>
     </p:spTree>
   </p:cSld>
   <p:clrMapOvr>
@@ -8299,9 +8343,187 @@
           <a:bodyPr/>
           <a:lstStyle/>
           <a:p>
+            <a:endParaRPr lang="en-US"/>
+          </a:p>
+        </p:txBody>
+      </p:sp>
+      <p:pic>
+        <p:nvPicPr>
+          <p:cNvPr id="4" name="Picture 3" descr="seqal_lprm_dpmr-full_5.pdf"/>
+          <p:cNvPicPr>
+            <a:picLocks noChangeAspect="1"/>
+          </p:cNvPicPr>
+          <p:nvPr/>
+        </p:nvPicPr>
+        <mc:AlternateContent>
+          <mc:Choice xmlns:ma="http://schemas.microsoft.com/office/mac/drawingml/2008/main" Requires="ma">
+            <p:blipFill>
+              <a:blip r:embed="rId2"/>
+              <a:stretch>
+                <a:fillRect/>
+              </a:stretch>
+            </p:blipFill>
+          </mc:Choice>
+          <mc:Fallback>
+            <p:blipFill>
+              <a:blip r:embed="rId3"/>
+              <a:stretch>
+                <a:fillRect/>
+              </a:stretch>
+            </p:blipFill>
+          </mc:Fallback>
+        </mc:AlternateContent>
+        <p:spPr>
+          <a:xfrm>
+            <a:off x="1114424" y="1388134"/>
+            <a:ext cx="6801729" cy="3945866"/>
+          </a:xfrm>
+          <a:prstGeom prst="rect">
+            <a:avLst/>
+          </a:prstGeom>
+        </p:spPr>
+      </p:pic>
+      <p:sp>
+        <p:nvSpPr>
+          <p:cNvPr id="5" name="TextBox 4"/>
+          <p:cNvSpPr txBox="1"/>
+          <p:nvPr/>
+        </p:nvSpPr>
+        <p:spPr>
+          <a:xfrm>
+            <a:off x="774700" y="5054600"/>
+            <a:ext cx="7980595" cy="1384995"/>
+          </a:xfrm>
+          <a:prstGeom prst="rect">
+            <a:avLst/>
+          </a:prstGeom>
+          <a:noFill/>
+        </p:spPr>
+        <p:txBody>
+          <a:bodyPr wrap="none" rtlCol="0">
+            <a:spAutoFit/>
+          </a:bodyPr>
+          <a:lstStyle/>
+          <a:p>
+            <a:r>
+              <a:rPr lang="en-US" sz="1200" b="1" dirty="0" smtClean="0"/>
+              <a:t>Scale-across:</a:t>
+            </a:r>
+          </a:p>
+          <a:p>
+            <a:r>
+              <a:rPr lang="en-US" sz="1200" dirty="0" smtClean="0"/>
+              <a:t>Comparison of the total time-to-solution for a </a:t>
+            </a:r>
+            <a:r>
+              <a:rPr lang="en-US" sz="1200" dirty="0" err="1" smtClean="0"/>
+              <a:t>MapReduce</a:t>
+            </a:r>
+            <a:r>
+              <a:rPr lang="en-US" sz="1200" dirty="0" smtClean="0"/>
+              <a:t>- based computation of alignment and </a:t>
+            </a:r>
+          </a:p>
+          <a:p>
+            <a:r>
+              <a:rPr lang="en-US" sz="1200" dirty="0" smtClean="0"/>
+              <a:t>duplicate read removal. </a:t>
+            </a:r>
+            <a:r>
+              <a:rPr lang="en-US" sz="1200" dirty="0" err="1" smtClean="0"/>
+              <a:t>Hadoop</a:t>
+            </a:r>
+            <a:r>
+              <a:rPr lang="en-US" sz="1200" dirty="0" smtClean="0"/>
+              <a:t> based </a:t>
+            </a:r>
+            <a:r>
+              <a:rPr lang="en-US" sz="1200" dirty="0" err="1" smtClean="0"/>
+              <a:t>Seqal</a:t>
+            </a:r>
+            <a:r>
+              <a:rPr lang="en-US" sz="1200" dirty="0" smtClean="0"/>
+              <a:t> is compared to local-PMR vs. distributed-PMR.</a:t>
+            </a:r>
+          </a:p>
+          <a:p>
+            <a:r>
+              <a:rPr lang="en-US" sz="1200" dirty="0" smtClean="0"/>
+              <a:t>For this experiment, the number of Nodes is 4, the number of Workers is 8,the number of Reducers is 8,</a:t>
+            </a:r>
+          </a:p>
+          <a:p>
+            <a:r>
+              <a:rPr lang="en-US" sz="1200" dirty="0" smtClean="0"/>
+              <a:t>And the number of reads in each chunk is 292,763. For the distributed-PMR, two machines of </a:t>
+            </a:r>
+            <a:r>
+              <a:rPr lang="en-US" sz="1200" dirty="0" err="1" smtClean="0"/>
+              <a:t>FutureGrid</a:t>
+            </a:r>
+            <a:r>
+              <a:rPr lang="en-US" sz="1200" dirty="0" smtClean="0"/>
+              <a:t>, </a:t>
+            </a:r>
+          </a:p>
+          <a:p>
+            <a:r>
+              <a:rPr lang="en-US" sz="1200" dirty="0" smtClean="0"/>
+              <a:t>Sierra and Hotel were used, whereas Sierra was used for other cases. </a:t>
+            </a:r>
+          </a:p>
+          <a:p>
+            <a:endParaRPr lang="en-US" sz="1200" dirty="0"/>
+          </a:p>
+        </p:txBody>
+      </p:sp>
+    </p:spTree>
+  </p:cSld>
+  <p:clrMapOvr>
+    <a:masterClrMapping/>
+  </p:clrMapOvr>
+</p:sld>
+</file>
+
+<file path=ppt/slides/slide21.xml><?xml version="1.0" encoding="utf-8"?>
+<p:sld xmlns:a="http://schemas.openxmlformats.org/drawingml/2006/main" xmlns:r="http://schemas.openxmlformats.org/officeDocument/2006/relationships" xmlns:mc="http://schemas.openxmlformats.org/markup-compatibility/2006" xmlns:mv="urn:schemas-microsoft-com:mac:vml" xmlns:p="http://schemas.openxmlformats.org/presentationml/2006/main" mc:Ignorable="mv" mc:PreserveAttributes="mv:*">
+  <p:cSld>
+    <p:spTree>
+      <p:nvGrpSpPr>
+        <p:cNvPr id="1" name=""/>
+        <p:cNvGrpSpPr/>
+        <p:nvPr/>
+      </p:nvGrpSpPr>
+      <p:grpSpPr>
+        <a:xfrm>
+          <a:off x="0" y="0"/>
+          <a:ext cx="0" cy="0"/>
+          <a:chOff x="0" y="0"/>
+          <a:chExt cx="0" cy="0"/>
+        </a:xfrm>
+      </p:grpSpPr>
+      <p:sp>
+        <p:nvSpPr>
+          <p:cNvPr id="2" name="Title 1"/>
+          <p:cNvSpPr>
+            <a:spLocks noGrp="1"/>
+          </p:cNvSpPr>
+          <p:nvPr>
+            <p:ph type="title"/>
+          </p:nvPr>
+        </p:nvSpPr>
+        <p:spPr/>
+        <p:txBody>
+          <a:bodyPr/>
+          <a:lstStyle/>
+          <a:p>
             <a:r>
               <a:rPr lang="en-US" dirty="0" smtClean="0"/>
-              <a:t>PMR Extensibility and Parallelism</a:t>
+              <a:t>PMR </a:t>
+            </a:r>
+            <a:r>
+              <a:rPr lang="en-US" dirty="0" smtClean="0"/>
+              <a:t>Extensibility</a:t>
             </a:r>
             <a:endParaRPr lang="en-US" dirty="0"/>
           </a:p>
@@ -8380,230 +8602,105 @@
           </a:prstGeom>
         </p:spPr>
       </p:pic>
-      <p:pic>
-        <p:nvPicPr>
-          <p:cNvPr id="7" name="Picture 6" descr="fig6_bw2.pdf"/>
-          <p:cNvPicPr>
-            <a:picLocks noChangeAspect="1"/>
-          </p:cNvPicPr>
+      <p:sp>
+        <p:nvSpPr>
+          <p:cNvPr id="8" name="TextBox 7"/>
+          <p:cNvSpPr txBox="1"/>
           <p:nvPr/>
-        </p:nvPicPr>
-        <mc:AlternateContent>
-          <mc:Choice xmlns:ma="http://schemas.microsoft.com/office/mac/drawingml/2008/main" Requires="ma">
-            <p:blipFill>
-              <a:blip r:embed="rId6"/>
-              <a:stretch>
-                <a:fillRect/>
-              </a:stretch>
-            </p:blipFill>
-          </mc:Choice>
-          <mc:Fallback>
-            <p:blipFill>
-              <a:blip r:embed="rId7"/>
-              <a:stretch>
-                <a:fillRect/>
-              </a:stretch>
-            </p:blipFill>
-          </mc:Fallback>
-        </mc:AlternateContent>
+        </p:nvSpPr>
         <p:spPr>
           <a:xfrm>
-            <a:off x="2501900" y="3902734"/>
-            <a:ext cx="5092700" cy="2721308"/>
+            <a:off x="469901" y="4052669"/>
+            <a:ext cx="8318499" cy="1384995"/>
           </a:xfrm>
           <a:prstGeom prst="rect">
             <a:avLst/>
           </a:prstGeom>
+          <a:noFill/>
         </p:spPr>
-      </p:pic>
+        <p:txBody>
+          <a:bodyPr wrap="square" rtlCol="0">
+            <a:spAutoFit/>
+          </a:bodyPr>
+          <a:lstStyle/>
+          <a:p>
+            <a:r>
+              <a:rPr lang="en-US" sz="1200" b="1" dirty="0" smtClean="0"/>
+              <a:t>Extensibility</a:t>
+            </a:r>
+            <a:r>
+              <a:rPr lang="en-US" sz="1200" dirty="0" smtClean="0"/>
+              <a:t>:</a:t>
+            </a:r>
+          </a:p>
+          <a:p>
+            <a:r>
+              <a:rPr lang="en-US" sz="1200" dirty="0" smtClean="0"/>
+              <a:t>Comparison of runtimes for the map phase. The map phase of </a:t>
+            </a:r>
+            <a:r>
+              <a:rPr lang="en-US" sz="1200" dirty="0" err="1" smtClean="0"/>
+              <a:t>Seqal</a:t>
+            </a:r>
+            <a:r>
+              <a:rPr lang="en-US" sz="1200" dirty="0" smtClean="0"/>
+              <a:t>, local-PMR(BWA), distributed-PMR(BWA), </a:t>
+            </a:r>
+          </a:p>
+          <a:p>
+            <a:r>
+              <a:rPr lang="en-US" sz="1200" dirty="0" smtClean="0"/>
+              <a:t>local- </a:t>
+            </a:r>
+            <a:r>
+              <a:rPr lang="en-US" sz="1200" dirty="0" err="1" smtClean="0"/>
+              <a:t>PMR(Bowtie</a:t>
+            </a:r>
+            <a:r>
+              <a:rPr lang="en-US" sz="1200" dirty="0" smtClean="0"/>
+              <a:t>), distributed-</a:t>
+            </a:r>
+            <a:r>
+              <a:rPr lang="en-US" sz="1200" dirty="0" err="1" smtClean="0"/>
+              <a:t>PMR(Bowtie</a:t>
+            </a:r>
+            <a:r>
+              <a:rPr lang="en-US" sz="1200" dirty="0" smtClean="0"/>
+              <a:t>), and </a:t>
+            </a:r>
+            <a:r>
+              <a:rPr lang="en-US" sz="1200" dirty="0" err="1" smtClean="0"/>
+              <a:t>Crossbow(Bowtie</a:t>
+            </a:r>
+            <a:r>
+              <a:rPr lang="en-US" sz="1200" dirty="0" smtClean="0"/>
+              <a:t>) are compared. The aligner used for each </a:t>
+            </a:r>
+          </a:p>
+          <a:p>
+            <a:r>
+              <a:rPr lang="en-US" sz="1200" dirty="0" smtClean="0"/>
+              <a:t>case is indicated in a parenthesis. For this experiment, the number of nodes is 4, the number of Workers,  is 8,and the number of reads in each chunk is 292,763. For the distributed-PMR, two machines of </a:t>
+            </a:r>
+            <a:r>
+              <a:rPr lang="en-US" sz="1200" dirty="0" err="1" smtClean="0"/>
+              <a:t>FutureGrid</a:t>
+            </a:r>
+            <a:r>
+              <a:rPr lang="en-US" sz="1200" dirty="0" smtClean="0"/>
+              <a:t>, Sierra and Hotel were used, whereas Sierra was used for other cases. </a:t>
+            </a:r>
+          </a:p>
+          <a:p>
+            <a:endParaRPr lang="en-US" sz="1200" dirty="0"/>
+          </a:p>
+        </p:txBody>
+      </p:sp>
     </p:spTree>
   </p:cSld>
   <p:clrMapOvr>
     <a:masterClrMapping/>
   </p:clrMapOvr>
-</p:sld>
-</file>
-
-<file path=ppt/slides/slide21.xml><?xml version="1.0" encoding="utf-8"?>
-<p:sld xmlns:a="http://schemas.openxmlformats.org/drawingml/2006/main" xmlns:r="http://schemas.openxmlformats.org/officeDocument/2006/relationships" xmlns:mc="http://schemas.openxmlformats.org/markup-compatibility/2006" xmlns:mv="urn:schemas-microsoft-com:mac:vml" xmlns:p="http://schemas.openxmlformats.org/presentationml/2006/main" mc:Ignorable="mv" mc:PreserveAttributes="mv:*">
-  <p:cSld>
-    <p:spTree>
-      <p:nvGrpSpPr>
-        <p:cNvPr id="1" name=""/>
-        <p:cNvGrpSpPr/>
-        <p:nvPr/>
-      </p:nvGrpSpPr>
-      <p:grpSpPr>
-        <a:xfrm>
-          <a:off x="0" y="0"/>
-          <a:ext cx="0" cy="0"/>
-          <a:chOff x="0" y="0"/>
-          <a:chExt cx="0" cy="0"/>
-        </a:xfrm>
-      </p:grpSpPr>
-      <p:sp>
-        <p:nvSpPr>
-          <p:cNvPr id="2" name="Title 1"/>
-          <p:cNvSpPr>
-            <a:spLocks noGrp="1"/>
-          </p:cNvSpPr>
-          <p:nvPr>
-            <p:ph type="title"/>
-          </p:nvPr>
-        </p:nvSpPr>
-        <p:spPr/>
-        <p:txBody>
-          <a:bodyPr/>
-          <a:lstStyle/>
-          <a:p>
-            <a:r>
-              <a:rPr lang="en-US" dirty="0" smtClean="0"/>
-              <a:t>Conclusions</a:t>
-            </a:r>
-            <a:endParaRPr lang="en-US" dirty="0"/>
-          </a:p>
-        </p:txBody>
-      </p:sp>
-      <p:sp>
-        <p:nvSpPr>
-          <p:cNvPr id="3" name="Content Placeholder 2"/>
-          <p:cNvSpPr>
-            <a:spLocks noGrp="1"/>
-          </p:cNvSpPr>
-          <p:nvPr>
-            <p:ph idx="1"/>
-          </p:nvPr>
-        </p:nvSpPr>
-        <p:spPr/>
-        <p:txBody>
-          <a:bodyPr>
-            <a:normAutofit/>
-          </a:bodyPr>
-          <a:lstStyle/>
-          <a:p>
-            <a:r>
-              <a:rPr lang="en-US" dirty="0" smtClean="0"/>
-              <a:t>NGS Applications – data intensive applications </a:t>
-            </a:r>
-            <a:r>
-              <a:rPr lang="en-US" dirty="0" smtClean="0"/>
-              <a:t>present broad range of challenges at scale</a:t>
-            </a:r>
-          </a:p>
-          <a:p>
-            <a:pPr lvl="1"/>
-            <a:r>
-              <a:rPr lang="en-US" dirty="0" smtClean="0"/>
-              <a:t>Have characterized</a:t>
-            </a:r>
-            <a:r>
-              <a:rPr lang="en-US" dirty="0" smtClean="0"/>
-              <a:t> </a:t>
-            </a:r>
-            <a:r>
-              <a:rPr lang="en-US" dirty="0" err="1" smtClean="0"/>
-              <a:t>Seqal</a:t>
-            </a:r>
-            <a:r>
-              <a:rPr lang="en-US" dirty="0" smtClean="0"/>
-              <a:t> and Crossbow as </a:t>
-            </a:r>
-            <a:r>
-              <a:rPr lang="en-US" dirty="0" smtClean="0"/>
-              <a:t>an example of alignment that can be used in  production DCI  </a:t>
-            </a:r>
-          </a:p>
-          <a:p>
-            <a:pPr lvl="1"/>
-            <a:r>
-              <a:rPr lang="en-US" dirty="0" smtClean="0"/>
-              <a:t>What are the CI challenges of NGS Analytics?</a:t>
-            </a:r>
-          </a:p>
-          <a:p>
-            <a:pPr lvl="2"/>
-            <a:r>
-              <a:rPr lang="en-US" dirty="0" smtClean="0"/>
-              <a:t>Exploring HTC, HPC-grids and Clouds</a:t>
-            </a:r>
-            <a:endParaRPr lang="en-US" dirty="0" smtClean="0"/>
-          </a:p>
-          <a:p>
-            <a:pPr lvl="1">
-              <a:buNone/>
-            </a:pPr>
-            <a:endParaRPr lang="en-US" dirty="0" smtClean="0"/>
-          </a:p>
-          <a:p>
-            <a:pPr lvl="1"/>
-            <a:r>
-              <a:rPr lang="en-US" sz="2000" dirty="0" smtClean="0">
-                <a:solidFill>
-                  <a:schemeClr val="tx1">
-                    <a:lumMod val="65000"/>
-                    <a:lumOff val="35000"/>
-                  </a:schemeClr>
-                </a:solidFill>
-              </a:rPr>
-              <a:t>DARE and </a:t>
-            </a:r>
-            <a:r>
-              <a:rPr lang="en-US" sz="2000" dirty="0" smtClean="0">
-                <a:solidFill>
-                  <a:schemeClr val="tx1">
-                    <a:lumMod val="65000"/>
-                    <a:lumOff val="35000"/>
-                  </a:schemeClr>
-                </a:solidFill>
-              </a:rPr>
-              <a:t>beyond</a:t>
-            </a:r>
-            <a:endParaRPr lang="en-US" i="1" dirty="0" smtClean="0"/>
-          </a:p>
-          <a:p>
-            <a:pPr lvl="2"/>
-            <a:r>
-              <a:rPr lang="en-US" dirty="0" smtClean="0">
-                <a:solidFill>
-                  <a:schemeClr val="accent5"/>
-                </a:solidFill>
-              </a:rPr>
-              <a:t>PMR-based NGS tools, implemented and scrutinized in this work, were developed in conjunction with our development of the runtime environment for dynamic applications, Distributed Application Runtime Environment (DARE)</a:t>
-            </a:r>
-            <a:r>
-              <a:rPr lang="en-US" dirty="0" smtClean="0">
-                <a:solidFill>
-                  <a:schemeClr val="accent5"/>
-                </a:solidFill>
-              </a:rPr>
-              <a:t> </a:t>
-            </a:r>
-            <a:r>
-              <a:rPr lang="en-US" dirty="0" smtClean="0"/>
-              <a:t> </a:t>
-            </a:r>
-            <a:endParaRPr lang="en-US" dirty="0" smtClean="0"/>
-          </a:p>
-          <a:p>
-            <a:pPr lvl="1">
-              <a:buNone/>
-            </a:pPr>
-            <a:endParaRPr lang="en-US" dirty="0"/>
-          </a:p>
-        </p:txBody>
-      </p:sp>
-    </p:spTree>
-  </p:cSld>
-  <p:clrMapOvr>
-    <a:masterClrMapping/>
-  </p:clrMapOvr>
-  <p:timing>
-    <p:tnLst>
-      <p:par>
-        <p:cTn id="1" dur="indefinite" restart="never" nodeType="tmRoot"/>
-      </p:par>
-    </p:tnLst>
-  </p:timing>
 </p:sld>
 </file>
 
@@ -8640,6 +8737,298 @@
           <a:lstStyle/>
           <a:p>
             <a:r>
+              <a:rPr lang="en-US" dirty="0" smtClean="0"/>
+              <a:t>PMR</a:t>
+            </a:r>
+            <a:r>
+              <a:rPr lang="en-US" dirty="0" smtClean="0"/>
+              <a:t> Parallelism</a:t>
+            </a:r>
+            <a:endParaRPr lang="en-US" dirty="0"/>
+          </a:p>
+        </p:txBody>
+      </p:sp>
+      <p:pic>
+        <p:nvPicPr>
+          <p:cNvPr id="4" name="Picture 3" descr="fig6_bw2.pdf"/>
+          <p:cNvPicPr>
+            <a:picLocks noChangeAspect="1"/>
+          </p:cNvPicPr>
+          <p:nvPr/>
+        </p:nvPicPr>
+        <mc:AlternateContent>
+          <mc:Choice xmlns:ma="http://schemas.microsoft.com/office/mac/drawingml/2008/main" Requires="ma">
+            <p:blipFill>
+              <a:blip r:embed="rId2"/>
+              <a:stretch>
+                <a:fillRect/>
+              </a:stretch>
+            </p:blipFill>
+          </mc:Choice>
+          <mc:Fallback>
+            <p:blipFill>
+              <a:blip r:embed="rId3"/>
+              <a:stretch>
+                <a:fillRect/>
+              </a:stretch>
+            </p:blipFill>
+          </mc:Fallback>
+        </mc:AlternateContent>
+        <p:spPr>
+          <a:xfrm>
+            <a:off x="1534800" y="1400834"/>
+            <a:ext cx="6338610" cy="3387066"/>
+          </a:xfrm>
+          <a:prstGeom prst="rect">
+            <a:avLst/>
+          </a:prstGeom>
+        </p:spPr>
+      </p:pic>
+      <p:sp>
+        <p:nvSpPr>
+          <p:cNvPr id="5" name="TextBox 4"/>
+          <p:cNvSpPr txBox="1"/>
+          <p:nvPr/>
+        </p:nvSpPr>
+        <p:spPr>
+          <a:xfrm>
+            <a:off x="1534800" y="5016500"/>
+            <a:ext cx="6834500" cy="1200329"/>
+          </a:xfrm>
+          <a:prstGeom prst="rect">
+            <a:avLst/>
+          </a:prstGeom>
+          <a:noFill/>
+        </p:spPr>
+        <p:txBody>
+          <a:bodyPr wrap="square" rtlCol="0">
+            <a:spAutoFit/>
+          </a:bodyPr>
+          <a:lstStyle/>
+          <a:p>
+            <a:r>
+              <a:rPr lang="en-US" sz="1200" b="1" dirty="0" smtClean="0"/>
+              <a:t>Fine Grain Parallelism:</a:t>
+            </a:r>
+          </a:p>
+          <a:p>
+            <a:r>
+              <a:rPr lang="en-US" sz="1200" dirty="0" smtClean="0"/>
+              <a:t>The map phase runtimes of </a:t>
+            </a:r>
+            <a:r>
+              <a:rPr lang="en-US" sz="1200" dirty="0" err="1" smtClean="0"/>
+              <a:t>PMR(Bowtie</a:t>
+            </a:r>
+            <a:r>
+              <a:rPr lang="en-US" sz="1200" dirty="0" smtClean="0"/>
+              <a:t>) and </a:t>
+            </a:r>
+            <a:r>
+              <a:rPr lang="en-US" sz="1200" dirty="0" err="1" smtClean="0"/>
+              <a:t>Crossbow(Bowtie</a:t>
+            </a:r>
+            <a:r>
+              <a:rPr lang="en-US" sz="1200" dirty="0" smtClean="0"/>
+              <a:t>) are compared, by varying number of threads for each map task. Number of workers/Node = 2 and input data size is 8 GB. The maximum number of cores assigned to a worker is 4, so we used 4 threads to achieve maximum fine-grain parallelism </a:t>
+            </a:r>
+          </a:p>
+          <a:p>
+            <a:endParaRPr lang="en-US" sz="1200" dirty="0"/>
+          </a:p>
+        </p:txBody>
+      </p:sp>
+    </p:spTree>
+  </p:cSld>
+  <p:clrMapOvr>
+    <a:masterClrMapping/>
+  </p:clrMapOvr>
+</p:sld>
+</file>
+
+<file path=ppt/slides/slide23.xml><?xml version="1.0" encoding="utf-8"?>
+<p:sld xmlns:a="http://schemas.openxmlformats.org/drawingml/2006/main" xmlns:r="http://schemas.openxmlformats.org/officeDocument/2006/relationships" xmlns:mc="http://schemas.openxmlformats.org/markup-compatibility/2006" xmlns:mv="urn:schemas-microsoft-com:mac:vml" xmlns:p="http://schemas.openxmlformats.org/presentationml/2006/main" mc:Ignorable="mv" mc:PreserveAttributes="mv:*">
+  <p:cSld>
+    <p:spTree>
+      <p:nvGrpSpPr>
+        <p:cNvPr id="1" name=""/>
+        <p:cNvGrpSpPr/>
+        <p:nvPr/>
+      </p:nvGrpSpPr>
+      <p:grpSpPr>
+        <a:xfrm>
+          <a:off x="0" y="0"/>
+          <a:ext cx="0" cy="0"/>
+          <a:chOff x="0" y="0"/>
+          <a:chExt cx="0" cy="0"/>
+        </a:xfrm>
+      </p:grpSpPr>
+      <p:sp>
+        <p:nvSpPr>
+          <p:cNvPr id="2" name="Title 1"/>
+          <p:cNvSpPr>
+            <a:spLocks noGrp="1"/>
+          </p:cNvSpPr>
+          <p:nvPr>
+            <p:ph type="title"/>
+          </p:nvPr>
+        </p:nvSpPr>
+        <p:spPr/>
+        <p:txBody>
+          <a:bodyPr/>
+          <a:lstStyle/>
+          <a:p>
+            <a:r>
+              <a:rPr lang="en-US" dirty="0" smtClean="0"/>
+              <a:t>Conclusions</a:t>
+            </a:r>
+            <a:endParaRPr lang="en-US" dirty="0"/>
+          </a:p>
+        </p:txBody>
+      </p:sp>
+      <p:sp>
+        <p:nvSpPr>
+          <p:cNvPr id="3" name="Content Placeholder 2"/>
+          <p:cNvSpPr>
+            <a:spLocks noGrp="1"/>
+          </p:cNvSpPr>
+          <p:nvPr>
+            <p:ph idx="1"/>
+          </p:nvPr>
+        </p:nvSpPr>
+        <p:spPr/>
+        <p:txBody>
+          <a:bodyPr>
+            <a:normAutofit/>
+          </a:bodyPr>
+          <a:lstStyle/>
+          <a:p>
+            <a:r>
+              <a:rPr lang="en-US" dirty="0" smtClean="0"/>
+              <a:t>NGS Applications – data intensive applications present broad range of challenges at scale</a:t>
+            </a:r>
+          </a:p>
+          <a:p>
+            <a:pPr lvl="1"/>
+            <a:r>
+              <a:rPr lang="en-US" dirty="0" smtClean="0"/>
+              <a:t>Have characterized </a:t>
+            </a:r>
+            <a:r>
+              <a:rPr lang="en-US" dirty="0" err="1" smtClean="0"/>
+              <a:t>Seqal</a:t>
+            </a:r>
+            <a:r>
+              <a:rPr lang="en-US" dirty="0" smtClean="0"/>
+              <a:t> and Crossbow as an example of alignment that can be used in  production DCI  </a:t>
+            </a:r>
+          </a:p>
+          <a:p>
+            <a:pPr lvl="1"/>
+            <a:r>
+              <a:rPr lang="en-US" dirty="0" smtClean="0"/>
+              <a:t>What are the CI challenges of NGS Analytics?</a:t>
+            </a:r>
+          </a:p>
+          <a:p>
+            <a:pPr lvl="2"/>
+            <a:r>
+              <a:rPr lang="en-US" dirty="0" smtClean="0"/>
+              <a:t>Exploring HTC, HPC-grids and Clouds</a:t>
+            </a:r>
+          </a:p>
+          <a:p>
+            <a:pPr lvl="1">
+              <a:buNone/>
+            </a:pPr>
+            <a:endParaRPr lang="en-US" dirty="0" smtClean="0"/>
+          </a:p>
+          <a:p>
+            <a:pPr lvl="1"/>
+            <a:r>
+              <a:rPr lang="en-US" sz="2000" dirty="0" smtClean="0">
+                <a:solidFill>
+                  <a:schemeClr val="tx1">
+                    <a:lumMod val="65000"/>
+                    <a:lumOff val="35000"/>
+                  </a:schemeClr>
+                </a:solidFill>
+              </a:rPr>
+              <a:t>DARE and beyond</a:t>
+            </a:r>
+            <a:endParaRPr lang="en-US" i="1" dirty="0" smtClean="0"/>
+          </a:p>
+          <a:p>
+            <a:pPr lvl="2"/>
+            <a:r>
+              <a:rPr lang="en-US" dirty="0" smtClean="0">
+                <a:solidFill>
+                  <a:schemeClr val="accent5"/>
+                </a:solidFill>
+              </a:rPr>
+              <a:t>PMR-based NGS tools, implemented and scrutinized in this work, were developed in conjunction with our development of the runtime environment for dynamic applications, Distributed Application Runtime Environment (DARE) </a:t>
+            </a:r>
+            <a:r>
+              <a:rPr lang="en-US" dirty="0" smtClean="0"/>
+              <a:t> </a:t>
+            </a:r>
+          </a:p>
+          <a:p>
+            <a:pPr lvl="1">
+              <a:buNone/>
+            </a:pPr>
+            <a:endParaRPr lang="en-US" dirty="0"/>
+          </a:p>
+        </p:txBody>
+      </p:sp>
+    </p:spTree>
+  </p:cSld>
+  <p:clrMapOvr>
+    <a:masterClrMapping/>
+  </p:clrMapOvr>
+  <p:timing>
+    <p:tnLst>
+      <p:par>
+        <p:cTn id="1" dur="indefinite" restart="never" nodeType="tmRoot"/>
+      </p:par>
+    </p:tnLst>
+  </p:timing>
+</p:sld>
+</file>
+
+<file path=ppt/slides/slide24.xml><?xml version="1.0" encoding="utf-8"?>
+<p:sld xmlns:a="http://schemas.openxmlformats.org/drawingml/2006/main" xmlns:r="http://schemas.openxmlformats.org/officeDocument/2006/relationships" xmlns:mc="http://schemas.openxmlformats.org/markup-compatibility/2006" xmlns:mv="urn:schemas-microsoft-com:mac:vml" xmlns:p="http://schemas.openxmlformats.org/presentationml/2006/main" mc:Ignorable="mv" mc:PreserveAttributes="mv:*">
+  <p:cSld>
+    <p:spTree>
+      <p:nvGrpSpPr>
+        <p:cNvPr id="1" name=""/>
+        <p:cNvGrpSpPr/>
+        <p:nvPr/>
+      </p:nvGrpSpPr>
+      <p:grpSpPr>
+        <a:xfrm>
+          <a:off x="0" y="0"/>
+          <a:ext cx="0" cy="0"/>
+          <a:chOff x="0" y="0"/>
+          <a:chExt cx="0" cy="0"/>
+        </a:xfrm>
+      </p:grpSpPr>
+      <p:sp>
+        <p:nvSpPr>
+          <p:cNvPr id="2" name="Title 1"/>
+          <p:cNvSpPr>
+            <a:spLocks noGrp="1"/>
+          </p:cNvSpPr>
+          <p:nvPr>
+            <p:ph type="title"/>
+          </p:nvPr>
+        </p:nvSpPr>
+        <p:spPr/>
+        <p:txBody>
+          <a:bodyPr/>
+          <a:lstStyle/>
+          <a:p>
+            <a:r>
               <a:rPr lang="en-US" smtClean="0"/>
               <a:t>Acknowledgements</a:t>
             </a:r>
@@ -8779,11 +9168,7 @@
             </a:pPr>
             <a:r>
               <a:rPr lang="en-US" i="1" dirty="0" smtClean="0"/>
-              <a:t>    </a:t>
-            </a:r>
-            <a:r>
-              <a:rPr lang="en-US" i="1" dirty="0" smtClean="0"/>
-              <a:t> </a:t>
+              <a:t>     </a:t>
             </a:r>
             <a:endParaRPr lang="en-US" dirty="0"/>
           </a:p>

</xml_diff>